<commit_message>
added test code for project2b
</commit_message>
<xml_diff>
--- a/lab1/CIS330_S18_Lab1.pptx
+++ b/lab1/CIS330_S18_Lab1.pptx
@@ -5,7 +5,7 @@
     <p:sldMasterId id="2147483715" r:id="rId1"/>
   </p:sldMasterIdLst>
   <p:notesMasterIdLst>
-    <p:notesMasterId r:id="rId25"/>
+    <p:notesMasterId r:id="rId24"/>
   </p:notesMasterIdLst>
   <p:sldIdLst>
     <p:sldId id="259" r:id="rId2"/>
@@ -25,12 +25,11 @@
     <p:sldId id="529" r:id="rId16"/>
     <p:sldId id="520" r:id="rId17"/>
     <p:sldId id="519" r:id="rId18"/>
-    <p:sldId id="523" r:id="rId19"/>
-    <p:sldId id="524" r:id="rId20"/>
-    <p:sldId id="525" r:id="rId21"/>
-    <p:sldId id="526" r:id="rId22"/>
-    <p:sldId id="527" r:id="rId23"/>
-    <p:sldId id="528" r:id="rId24"/>
+    <p:sldId id="524" r:id="rId19"/>
+    <p:sldId id="525" r:id="rId20"/>
+    <p:sldId id="526" r:id="rId21"/>
+    <p:sldId id="527" r:id="rId22"/>
+    <p:sldId id="528" r:id="rId23"/>
   </p:sldIdLst>
   <p:sldSz cx="9144000" cy="6858000" type="screen4x3"/>
   <p:notesSz cx="6858000" cy="9144000"/>
@@ -1167,7 +1166,7 @@
     </p:spTree>
     <p:extLst>
       <p:ext uri="{BB962C8B-B14F-4D97-AF65-F5344CB8AC3E}">
-        <p14:creationId xmlns:p14="http://schemas.microsoft.com/office/powerpoint/2010/main" val="1321242094"/>
+        <p14:creationId xmlns:p14="http://schemas.microsoft.com/office/powerpoint/2010/main" val="3374318621"/>
       </p:ext>
     </p:extLst>
   </p:cSld>
@@ -1251,7 +1250,7 @@
     </p:spTree>
     <p:extLst>
       <p:ext uri="{BB962C8B-B14F-4D97-AF65-F5344CB8AC3E}">
-        <p14:creationId xmlns:p14="http://schemas.microsoft.com/office/powerpoint/2010/main" val="3374318621"/>
+        <p14:creationId xmlns:p14="http://schemas.microsoft.com/office/powerpoint/2010/main" val="4292046128"/>
       </p:ext>
     </p:extLst>
   </p:cSld>
@@ -1335,7 +1334,7 @@
     </p:spTree>
     <p:extLst>
       <p:ext uri="{BB962C8B-B14F-4D97-AF65-F5344CB8AC3E}">
-        <p14:creationId xmlns:p14="http://schemas.microsoft.com/office/powerpoint/2010/main" val="4292046128"/>
+        <p14:creationId xmlns:p14="http://schemas.microsoft.com/office/powerpoint/2010/main" val="3034756861"/>
       </p:ext>
     </p:extLst>
   </p:cSld>
@@ -1419,7 +1418,7 @@
     </p:spTree>
     <p:extLst>
       <p:ext uri="{BB962C8B-B14F-4D97-AF65-F5344CB8AC3E}">
-        <p14:creationId xmlns:p14="http://schemas.microsoft.com/office/powerpoint/2010/main" val="3034756861"/>
+        <p14:creationId xmlns:p14="http://schemas.microsoft.com/office/powerpoint/2010/main" val="983534091"/>
       </p:ext>
     </p:extLst>
   </p:cSld>
@@ -1579,90 +1578,6 @@
             <a:fld id="{39FB796E-1204-6D45-A7B7-2B1650A5088F}" type="slidenum">
               <a:rPr lang="en-US" smtClean="0"/>
               <a:t>22</a:t>
-            </a:fld>
-            <a:endParaRPr lang="en-US"/>
-          </a:p>
-        </p:txBody>
-      </p:sp>
-    </p:spTree>
-    <p:extLst>
-      <p:ext uri="{BB962C8B-B14F-4D97-AF65-F5344CB8AC3E}">
-        <p14:creationId xmlns:p14="http://schemas.microsoft.com/office/powerpoint/2010/main" val="983534091"/>
-      </p:ext>
-    </p:extLst>
-  </p:cSld>
-  <p:clrMapOvr>
-    <a:masterClrMapping/>
-  </p:clrMapOvr>
-</p:notes>
-</file>
-
-<file path=ppt/notesSlides/notesSlide21.xml><?xml version="1.0" encoding="utf-8"?>
-<p:notes xmlns:a="http://schemas.openxmlformats.org/drawingml/2006/main" xmlns:r="http://schemas.openxmlformats.org/officeDocument/2006/relationships" xmlns:p="http://schemas.openxmlformats.org/presentationml/2006/main">
-  <p:cSld>
-    <p:spTree>
-      <p:nvGrpSpPr>
-        <p:cNvPr id="1" name=""/>
-        <p:cNvGrpSpPr/>
-        <p:nvPr/>
-      </p:nvGrpSpPr>
-      <p:grpSpPr>
-        <a:xfrm>
-          <a:off x="0" y="0"/>
-          <a:ext cx="0" cy="0"/>
-          <a:chOff x="0" y="0"/>
-          <a:chExt cx="0" cy="0"/>
-        </a:xfrm>
-      </p:grpSpPr>
-      <p:sp>
-        <p:nvSpPr>
-          <p:cNvPr id="2" name="Slide Image Placeholder 1"/>
-          <p:cNvSpPr>
-            <a:spLocks noGrp="1" noRot="1" noChangeAspect="1"/>
-          </p:cNvSpPr>
-          <p:nvPr>
-            <p:ph type="sldImg"/>
-          </p:nvPr>
-        </p:nvSpPr>
-        <p:spPr/>
-      </p:sp>
-      <p:sp>
-        <p:nvSpPr>
-          <p:cNvPr id="3" name="Notes Placeholder 2"/>
-          <p:cNvSpPr>
-            <a:spLocks noGrp="1"/>
-          </p:cNvSpPr>
-          <p:nvPr>
-            <p:ph type="body" idx="1"/>
-          </p:nvPr>
-        </p:nvSpPr>
-        <p:spPr/>
-        <p:txBody>
-          <a:bodyPr/>
-          <a:lstStyle/>
-          <a:p>
-            <a:endParaRPr lang="en-US"/>
-          </a:p>
-        </p:txBody>
-      </p:sp>
-      <p:sp>
-        <p:nvSpPr>
-          <p:cNvPr id="4" name="Slide Number Placeholder 3"/>
-          <p:cNvSpPr>
-            <a:spLocks noGrp="1"/>
-          </p:cNvSpPr>
-          <p:nvPr>
-            <p:ph type="sldNum" sz="quarter" idx="10"/>
-          </p:nvPr>
-        </p:nvSpPr>
-        <p:spPr/>
-        <p:txBody>
-          <a:bodyPr/>
-          <a:lstStyle/>
-          <a:p>
-            <a:fld id="{39FB796E-1204-6D45-A7B7-2B1650A5088F}" type="slidenum">
-              <a:rPr lang="en-US" smtClean="0"/>
-              <a:t>23</a:t>
             </a:fld>
             <a:endParaRPr lang="en-US"/>
           </a:p>
@@ -5940,6 +5855,13 @@
   <p:clrMapOvr>
     <a:masterClrMapping/>
   </p:clrMapOvr>
+  <p:timing>
+    <p:tnLst>
+      <p:par>
+        <p:cTn id="1" dur="indefinite" restart="never" nodeType="tmRoot"/>
+      </p:par>
+    </p:tnLst>
+  </p:timing>
 </p:sld>
 </file>
 
@@ -6091,6 +6013,13 @@
   <p:clrMapOvr>
     <a:masterClrMapping/>
   </p:clrMapOvr>
+  <p:timing>
+    <p:tnLst>
+      <p:par>
+        <p:cTn id="1" dur="indefinite" restart="never" nodeType="tmRoot"/>
+      </p:par>
+    </p:tnLst>
+  </p:timing>
 </p:sld>
 </file>
 
@@ -6250,6 +6179,13 @@
   <p:clrMapOvr>
     <a:masterClrMapping/>
   </p:clrMapOvr>
+  <p:timing>
+    <p:tnLst>
+      <p:par>
+        <p:cTn id="1" dur="indefinite" restart="never" nodeType="tmRoot"/>
+      </p:par>
+    </p:tnLst>
+  </p:timing>
 </p:sld>
 </file>
 
@@ -6406,6 +6342,13 @@
   <p:clrMapOvr>
     <a:masterClrMapping/>
   </p:clrMapOvr>
+  <p:timing>
+    <p:tnLst>
+      <p:par>
+        <p:cTn id="1" dur="indefinite" restart="never" nodeType="tmRoot"/>
+      </p:par>
+    </p:tnLst>
+  </p:timing>
 </p:sld>
 </file>
 
@@ -6603,6 +6546,13 @@
   <p:clrMapOvr>
     <a:masterClrMapping/>
   </p:clrMapOvr>
+  <p:timing>
+    <p:tnLst>
+      <p:par>
+        <p:cTn id="1" dur="indefinite" restart="never" nodeType="tmRoot"/>
+      </p:par>
+    </p:tnLst>
+  </p:timing>
 </p:sld>
 </file>
 
@@ -6902,6 +6852,13 @@
   <p:clrMapOvr>
     <a:masterClrMapping/>
   </p:clrMapOvr>
+  <p:timing>
+    <p:tnLst>
+      <p:par>
+        <p:cTn id="1" dur="indefinite" restart="never" nodeType="tmRoot"/>
+      </p:par>
+    </p:tnLst>
+  </p:timing>
 </p:sld>
 </file>
 
@@ -7128,8 +7085,23 @@
                 </a:solidFill>
                 <a:latin typeface="Calibri"/>
               </a:rPr>
-              <a:t>…but errors may occur while using gdb (mine seems broken now)</a:t>
-            </a:r>
+              <a:t>…but errors may occur while using </a:t>
+            </a:r>
+            <a:r>
+              <a:rPr lang="is-IS" dirty="0" smtClean="0">
+                <a:solidFill>
+                  <a:srgbClr val="000000"/>
+                </a:solidFill>
+                <a:latin typeface="Calibri"/>
+              </a:rPr>
+              <a:t>gdb</a:t>
+            </a:r>
+            <a:endParaRPr lang="is-IS" dirty="0" smtClean="0">
+              <a:solidFill>
+                <a:srgbClr val="000000"/>
+              </a:solidFill>
+              <a:latin typeface="Calibri"/>
+            </a:endParaRPr>
           </a:p>
           <a:p>
             <a:r>
@@ -7196,6 +7168,13 @@
   <p:clrMapOvr>
     <a:masterClrMapping/>
   </p:clrMapOvr>
+  <p:timing>
+    <p:tnLst>
+      <p:par>
+        <p:cTn id="1" dur="indefinite" restart="never" nodeType="tmRoot"/>
+      </p:par>
+    </p:tnLst>
+  </p:timing>
 </p:sld>
 </file>
 
@@ -7380,6 +7359,13 @@
   <p:clrMapOvr>
     <a:masterClrMapping/>
   </p:clrMapOvr>
+  <p:timing>
+    <p:tnLst>
+      <p:par>
+        <p:cTn id="1" dur="indefinite" restart="never" nodeType="tmRoot"/>
+      </p:par>
+    </p:tnLst>
+  </p:timing>
 </p:sld>
 </file>
 
@@ -7805,6 +7791,13 @@
   <p:clrMapOvr>
     <a:masterClrMapping/>
   </p:clrMapOvr>
+  <p:timing>
+    <p:tnLst>
+      <p:par>
+        <p:cTn id="1" dur="indefinite" restart="never" nodeType="tmRoot"/>
+      </p:par>
+    </p:tnLst>
+  </p:timing>
 </p:sld>
 </file>
 
@@ -7846,280 +7839,6 @@
             </a:r>
             <a:r>
               <a:rPr lang="en-US" err="1"/>
-              <a:t>gdb</a:t>
-            </a:r>
-            <a:endParaRPr lang="en-US">
-              <a:solidFill>
-                <a:srgbClr val="000000"/>
-              </a:solidFill>
-              <a:latin typeface="Calibri"/>
-            </a:endParaRPr>
-          </a:p>
-        </p:txBody>
-      </p:sp>
-      <p:sp>
-        <p:nvSpPr>
-          <p:cNvPr id="3" name="Content Placeholder 2"/>
-          <p:cNvSpPr>
-            <a:spLocks noGrp="1"/>
-          </p:cNvSpPr>
-          <p:nvPr>
-            <p:ph idx="1"/>
-          </p:nvPr>
-        </p:nvSpPr>
-        <p:spPr>
-          <a:xfrm>
-            <a:off x="93663" y="1600200"/>
-            <a:ext cx="8777287" cy="4133687"/>
-          </a:xfrm>
-        </p:spPr>
-        <p:txBody>
-          <a:bodyPr vert="horz" lIns="91440" tIns="45720" rIns="91440" bIns="45720" rtlCol="0" anchor="t">
-            <a:normAutofit fontScale="77500" lnSpcReduction="20000"/>
-          </a:bodyPr>
-          <a:lstStyle/>
-          <a:p>
-            <a:pPr marL="0" indent="0">
-              <a:buNone/>
-            </a:pPr>
-            <a:r>
-              <a:rPr lang="en-US" dirty="0">
-                <a:solidFill>
-                  <a:srgbClr val="000000"/>
-                </a:solidFill>
-                <a:latin typeface="Calibri"/>
-              </a:rPr>
-              <a:t>Useful commands in </a:t>
-            </a:r>
-            <a:r>
-              <a:rPr lang="en-US" dirty="0" err="1">
-                <a:solidFill>
-                  <a:srgbClr val="000000"/>
-                </a:solidFill>
-                <a:latin typeface="Calibri"/>
-              </a:rPr>
-              <a:t>gdb</a:t>
-            </a:r>
-            <a:r>
-              <a:rPr lang="en-US" dirty="0">
-                <a:solidFill>
-                  <a:srgbClr val="000000"/>
-                </a:solidFill>
-                <a:latin typeface="Calibri"/>
-              </a:rPr>
-              <a:t>: these are just </a:t>
-            </a:r>
-            <a:r>
-              <a:rPr lang="en-US" dirty="0" smtClean="0">
-                <a:solidFill>
-                  <a:srgbClr val="000000"/>
-                </a:solidFill>
-                <a:latin typeface="Calibri"/>
-              </a:rPr>
-              <a:t>a sampling of the most-used commands. </a:t>
-            </a:r>
-            <a:r>
-              <a:rPr lang="en-US" dirty="0">
-                <a:solidFill>
-                  <a:srgbClr val="000000"/>
-                </a:solidFill>
-                <a:latin typeface="Calibri"/>
-              </a:rPr>
-              <a:t>There </a:t>
-            </a:r>
-            <a:r>
-              <a:rPr lang="en-US" dirty="0" smtClean="0">
-                <a:solidFill>
-                  <a:srgbClr val="000000"/>
-                </a:solidFill>
-                <a:latin typeface="Calibri"/>
-              </a:rPr>
-              <a:t>are </a:t>
-            </a:r>
-            <a:r>
-              <a:rPr lang="en-US" dirty="0">
-                <a:solidFill>
-                  <a:srgbClr val="000000"/>
-                </a:solidFill>
-                <a:latin typeface="Calibri"/>
-              </a:rPr>
-              <a:t>a lot </a:t>
-            </a:r>
-            <a:r>
-              <a:rPr lang="en-US" dirty="0" smtClean="0">
-                <a:solidFill>
-                  <a:srgbClr val="000000"/>
-                </a:solidFill>
-                <a:latin typeface="Calibri"/>
-              </a:rPr>
-              <a:t>more, </a:t>
-            </a:r>
-            <a:r>
-              <a:rPr lang="en-US" dirty="0">
-                <a:solidFill>
-                  <a:srgbClr val="000000"/>
-                </a:solidFill>
-                <a:latin typeface="Calibri"/>
-              </a:rPr>
-              <a:t>too. It can be super helpful … have fun!</a:t>
-            </a:r>
-          </a:p>
-          <a:p>
-            <a:pPr marL="57150" indent="0">
-              <a:buNone/>
-            </a:pPr>
-            <a:endParaRPr lang="en-US" dirty="0">
-              <a:solidFill>
-                <a:srgbClr val="000000"/>
-              </a:solidFill>
-              <a:latin typeface="Calibri"/>
-            </a:endParaRPr>
-          </a:p>
-          <a:p>
-            <a:pPr marL="57150" indent="0">
-              <a:buNone/>
-            </a:pPr>
-            <a:r>
-              <a:rPr lang="en-US" dirty="0" smtClean="0">
-                <a:solidFill>
-                  <a:srgbClr val="000000"/>
-                </a:solidFill>
-                <a:latin typeface="Calibri"/>
-              </a:rPr>
-              <a:t>Story from Andy Hampton, Spring ‘17 330 GTF: “At </a:t>
-            </a:r>
-            <a:r>
-              <a:rPr lang="en-US" dirty="0">
-                <a:solidFill>
-                  <a:srgbClr val="000000"/>
-                </a:solidFill>
-                <a:latin typeface="Calibri"/>
-              </a:rPr>
-              <a:t>the start of my internship last summer, my mentor said he'd be on vacation for a week and asked me to get a program working. Running it gives one line of output: </a:t>
-            </a:r>
-            <a:r>
-              <a:rPr lang="en-US" dirty="0" err="1">
-                <a:solidFill>
-                  <a:srgbClr val="000000"/>
-                </a:solidFill>
-                <a:latin typeface="Calibri"/>
-              </a:rPr>
-              <a:t>seg</a:t>
-            </a:r>
-            <a:r>
-              <a:rPr lang="en-US" dirty="0">
-                <a:solidFill>
-                  <a:srgbClr val="000000"/>
-                </a:solidFill>
-                <a:latin typeface="Calibri"/>
-              </a:rPr>
-              <a:t> fault. Upon further inspection: program is 50k lines of code, built on library that's 100k lines </a:t>
-            </a:r>
-            <a:r>
-              <a:rPr lang="en-US" dirty="0" smtClean="0">
-                <a:solidFill>
-                  <a:srgbClr val="000000"/>
-                </a:solidFill>
-                <a:latin typeface="Calibri"/>
-              </a:rPr>
-              <a:t>:( “</a:t>
-            </a:r>
-            <a:endParaRPr lang="en-US" dirty="0">
-              <a:solidFill>
-                <a:srgbClr val="000000"/>
-              </a:solidFill>
-              <a:latin typeface="Calibri"/>
-            </a:endParaRPr>
-          </a:p>
-          <a:p>
-            <a:pPr marL="57150" indent="0">
-              <a:buNone/>
-            </a:pPr>
-            <a:endParaRPr lang="en-US" dirty="0">
-              <a:solidFill>
-                <a:srgbClr val="000000"/>
-              </a:solidFill>
-              <a:latin typeface="Calibri"/>
-            </a:endParaRPr>
-          </a:p>
-          <a:p>
-            <a:pPr marL="57150" indent="0">
-              <a:buNone/>
-            </a:pPr>
-            <a:r>
-              <a:rPr lang="en-US" dirty="0">
-                <a:solidFill>
-                  <a:srgbClr val="000000"/>
-                </a:solidFill>
-                <a:latin typeface="Calibri"/>
-              </a:rPr>
-              <a:t>It would be great to have some way to automatically detect certain errors ...</a:t>
-            </a:r>
-          </a:p>
-          <a:p>
-            <a:pPr marL="457200" lvl="1" indent="0">
-              <a:buNone/>
-            </a:pPr>
-            <a:endParaRPr lang="en-US" dirty="0">
-              <a:solidFill>
-                <a:srgbClr val="000000"/>
-              </a:solidFill>
-              <a:latin typeface="Calibri"/>
-            </a:endParaRPr>
-          </a:p>
-        </p:txBody>
-      </p:sp>
-    </p:spTree>
-    <p:extLst>
-      <p:ext uri="{BB962C8B-B14F-4D97-AF65-F5344CB8AC3E}">
-        <p14:creationId xmlns:p14="http://schemas.microsoft.com/office/powerpoint/2010/main" val="1319253"/>
-      </p:ext>
-    </p:extLst>
-  </p:cSld>
-  <p:clrMapOvr>
-    <a:masterClrMapping/>
-  </p:clrMapOvr>
-</p:sld>
-</file>
-
-<file path=ppt/slides/slide19.xml><?xml version="1.0" encoding="utf-8"?>
-<p:sld xmlns:a="http://schemas.openxmlformats.org/drawingml/2006/main" xmlns:r="http://schemas.openxmlformats.org/officeDocument/2006/relationships" xmlns:p="http://schemas.openxmlformats.org/presentationml/2006/main">
-  <p:cSld>
-    <p:spTree>
-      <p:nvGrpSpPr>
-        <p:cNvPr id="1" name=""/>
-        <p:cNvGrpSpPr/>
-        <p:nvPr/>
-      </p:nvGrpSpPr>
-      <p:grpSpPr>
-        <a:xfrm>
-          <a:off x="0" y="0"/>
-          <a:ext cx="0" cy="0"/>
-          <a:chOff x="0" y="0"/>
-          <a:chExt cx="0" cy="0"/>
-        </a:xfrm>
-      </p:grpSpPr>
-      <p:sp>
-        <p:nvSpPr>
-          <p:cNvPr id="2" name="Title 1"/>
-          <p:cNvSpPr>
-            <a:spLocks noGrp="1"/>
-          </p:cNvSpPr>
-          <p:nvPr>
-            <p:ph type="title"/>
-          </p:nvPr>
-        </p:nvSpPr>
-        <p:spPr/>
-        <p:txBody>
-          <a:bodyPr/>
-          <a:lstStyle/>
-          <a:p>
-            <a:r>
-              <a:rPr lang="en-US"/>
-              <a:t>Debugging: </a:t>
-            </a:r>
-            <a:r>
-              <a:rPr lang="en-US" err="1"/>
               <a:t>valgrind</a:t>
             </a:r>
             <a:endParaRPr lang="en-US">
@@ -8425,138 +8144,17 @@
   <p:clrMapOvr>
     <a:masterClrMapping/>
   </p:clrMapOvr>
+  <p:timing>
+    <p:tnLst>
+      <p:par>
+        <p:cTn id="1" dur="indefinite" restart="never" nodeType="tmRoot"/>
+      </p:par>
+    </p:tnLst>
+  </p:timing>
 </p:sld>
 </file>
 
-<file path=ppt/slides/slide2.xml><?xml version="1.0" encoding="utf-8"?>
-<p:sld xmlns:a="http://schemas.openxmlformats.org/drawingml/2006/main" xmlns:r="http://schemas.openxmlformats.org/officeDocument/2006/relationships" xmlns:p="http://schemas.openxmlformats.org/presentationml/2006/main">
-  <p:cSld>
-    <p:spTree>
-      <p:nvGrpSpPr>
-        <p:cNvPr id="1" name=""/>
-        <p:cNvGrpSpPr/>
-        <p:nvPr/>
-      </p:nvGrpSpPr>
-      <p:grpSpPr>
-        <a:xfrm>
-          <a:off x="0" y="0"/>
-          <a:ext cx="0" cy="0"/>
-          <a:chOff x="0" y="0"/>
-          <a:chExt cx="0" cy="0"/>
-        </a:xfrm>
-      </p:grpSpPr>
-      <p:sp>
-        <p:nvSpPr>
-          <p:cNvPr id="2" name="Title 1"/>
-          <p:cNvSpPr>
-            <a:spLocks noGrp="1"/>
-          </p:cNvSpPr>
-          <p:nvPr>
-            <p:ph type="title"/>
-          </p:nvPr>
-        </p:nvSpPr>
-        <p:spPr/>
-        <p:txBody>
-          <a:bodyPr/>
-          <a:lstStyle/>
-          <a:p>
-            <a:r>
-              <a:rPr lang="en-US"/>
-              <a:t>Unix command: </a:t>
-            </a:r>
-            <a:r>
-              <a:rPr lang="en-US" err="1"/>
-              <a:t>ssh</a:t>
-            </a:r>
-            <a:endParaRPr lang="en-US"/>
-          </a:p>
-        </p:txBody>
-      </p:sp>
-      <p:sp>
-        <p:nvSpPr>
-          <p:cNvPr id="3" name="Content Placeholder 2"/>
-          <p:cNvSpPr>
-            <a:spLocks noGrp="1"/>
-          </p:cNvSpPr>
-          <p:nvPr>
-            <p:ph idx="1"/>
-          </p:nvPr>
-        </p:nvSpPr>
-        <p:spPr>
-          <a:xfrm>
-            <a:off x="94075" y="1600200"/>
-            <a:ext cx="8777110" cy="4525963"/>
-          </a:xfrm>
-        </p:spPr>
-        <p:txBody>
-          <a:bodyPr vert="horz" lIns="91440" tIns="45720" rIns="91440" bIns="45720" rtlCol="0" anchor="t">
-            <a:normAutofit/>
-          </a:bodyPr>
-          <a:lstStyle/>
-          <a:p>
-            <a:r>
-              <a:rPr lang="en-US"/>
-              <a:t>Problem: you're using a computer, but you want to be using a different computer …</a:t>
-            </a:r>
-          </a:p>
-          <a:p>
-            <a:pPr lvl="1"/>
-            <a:r>
-              <a:rPr lang="en-US"/>
-              <a:t>the other computer is far away</a:t>
-            </a:r>
-          </a:p>
-          <a:p>
-            <a:pPr lvl="1"/>
-            <a:r>
-              <a:rPr lang="en-US"/>
-              <a:t>the other computer is inaccessible</a:t>
-            </a:r>
-          </a:p>
-          <a:p>
-            <a:pPr lvl="1"/>
-            <a:r>
-              <a:rPr lang="en-US"/>
-              <a:t>the other computer doesn't have a display (server)</a:t>
-            </a:r>
-          </a:p>
-          <a:p>
-            <a:pPr lvl="1"/>
-            <a:r>
-              <a:rPr lang="en-US"/>
-              <a:t>etc.</a:t>
-            </a:r>
-          </a:p>
-          <a:p>
-            <a:pPr lvl="1"/>
-            <a:endParaRPr lang="en-US"/>
-          </a:p>
-          <a:p>
-            <a:r>
-              <a:rPr lang="en-US" err="1"/>
-              <a:t>ssh</a:t>
-            </a:r>
-            <a:r>
-              <a:rPr lang="en-US"/>
-              <a:t> lets you log onto another machine</a:t>
-            </a:r>
-          </a:p>
-        </p:txBody>
-      </p:sp>
-    </p:spTree>
-    <p:extLst>
-      <p:ext uri="{BB962C8B-B14F-4D97-AF65-F5344CB8AC3E}">
-        <p14:creationId xmlns:p14="http://schemas.microsoft.com/office/powerpoint/2010/main" val="2956849678"/>
-      </p:ext>
-    </p:extLst>
-  </p:cSld>
-  <p:clrMapOvr>
-    <a:masterClrMapping/>
-  </p:clrMapOvr>
-</p:sld>
-</file>
-
-<file path=ppt/slides/slide20.xml><?xml version="1.0" encoding="utf-8"?>
+<file path=ppt/slides/slide19.xml><?xml version="1.0" encoding="utf-8"?>
 <p:sld xmlns:a="http://schemas.openxmlformats.org/drawingml/2006/main" xmlns:r="http://schemas.openxmlformats.org/officeDocument/2006/relationships" xmlns:p="http://schemas.openxmlformats.org/presentationml/2006/main">
   <p:cSld>
     <p:spTree>
@@ -8685,10 +8283,152 @@
   <p:clrMapOvr>
     <a:masterClrMapping/>
   </p:clrMapOvr>
+  <p:timing>
+    <p:tnLst>
+      <p:par>
+        <p:cTn id="1" dur="indefinite" restart="never" nodeType="tmRoot"/>
+      </p:par>
+    </p:tnLst>
+  </p:timing>
 </p:sld>
 </file>
 
-<file path=ppt/slides/slide21.xml><?xml version="1.0" encoding="utf-8"?>
+<file path=ppt/slides/slide2.xml><?xml version="1.0" encoding="utf-8"?>
+<p:sld xmlns:a="http://schemas.openxmlformats.org/drawingml/2006/main" xmlns:r="http://schemas.openxmlformats.org/officeDocument/2006/relationships" xmlns:p="http://schemas.openxmlformats.org/presentationml/2006/main">
+  <p:cSld>
+    <p:spTree>
+      <p:nvGrpSpPr>
+        <p:cNvPr id="1" name=""/>
+        <p:cNvGrpSpPr/>
+        <p:nvPr/>
+      </p:nvGrpSpPr>
+      <p:grpSpPr>
+        <a:xfrm>
+          <a:off x="0" y="0"/>
+          <a:ext cx="0" cy="0"/>
+          <a:chOff x="0" y="0"/>
+          <a:chExt cx="0" cy="0"/>
+        </a:xfrm>
+      </p:grpSpPr>
+      <p:sp>
+        <p:nvSpPr>
+          <p:cNvPr id="2" name="Title 1"/>
+          <p:cNvSpPr>
+            <a:spLocks noGrp="1"/>
+          </p:cNvSpPr>
+          <p:nvPr>
+            <p:ph type="title"/>
+          </p:nvPr>
+        </p:nvSpPr>
+        <p:spPr/>
+        <p:txBody>
+          <a:bodyPr/>
+          <a:lstStyle/>
+          <a:p>
+            <a:r>
+              <a:rPr lang="en-US"/>
+              <a:t>Unix command: </a:t>
+            </a:r>
+            <a:r>
+              <a:rPr lang="en-US" err="1"/>
+              <a:t>ssh</a:t>
+            </a:r>
+            <a:endParaRPr lang="en-US"/>
+          </a:p>
+        </p:txBody>
+      </p:sp>
+      <p:sp>
+        <p:nvSpPr>
+          <p:cNvPr id="3" name="Content Placeholder 2"/>
+          <p:cNvSpPr>
+            <a:spLocks noGrp="1"/>
+          </p:cNvSpPr>
+          <p:nvPr>
+            <p:ph idx="1"/>
+          </p:nvPr>
+        </p:nvSpPr>
+        <p:spPr>
+          <a:xfrm>
+            <a:off x="94075" y="1600200"/>
+            <a:ext cx="8777110" cy="4525963"/>
+          </a:xfrm>
+        </p:spPr>
+        <p:txBody>
+          <a:bodyPr vert="horz" lIns="91440" tIns="45720" rIns="91440" bIns="45720" rtlCol="0" anchor="t">
+            <a:normAutofit/>
+          </a:bodyPr>
+          <a:lstStyle/>
+          <a:p>
+            <a:r>
+              <a:rPr lang="en-US"/>
+              <a:t>Problem: you're using a computer, but you want to be using a different computer …</a:t>
+            </a:r>
+          </a:p>
+          <a:p>
+            <a:pPr lvl="1"/>
+            <a:r>
+              <a:rPr lang="en-US"/>
+              <a:t>the other computer is far away</a:t>
+            </a:r>
+          </a:p>
+          <a:p>
+            <a:pPr lvl="1"/>
+            <a:r>
+              <a:rPr lang="en-US"/>
+              <a:t>the other computer is inaccessible</a:t>
+            </a:r>
+          </a:p>
+          <a:p>
+            <a:pPr lvl="1"/>
+            <a:r>
+              <a:rPr lang="en-US"/>
+              <a:t>the other computer doesn't have a display (server)</a:t>
+            </a:r>
+          </a:p>
+          <a:p>
+            <a:pPr lvl="1"/>
+            <a:r>
+              <a:rPr lang="en-US"/>
+              <a:t>etc.</a:t>
+            </a:r>
+          </a:p>
+          <a:p>
+            <a:pPr lvl="1"/>
+            <a:endParaRPr lang="en-US"/>
+          </a:p>
+          <a:p>
+            <a:r>
+              <a:rPr lang="en-US" err="1"/>
+              <a:t>ssh</a:t>
+            </a:r>
+            <a:r>
+              <a:rPr lang="en-US"/>
+              <a:t> lets you log onto another machine</a:t>
+            </a:r>
+          </a:p>
+        </p:txBody>
+      </p:sp>
+    </p:spTree>
+    <p:extLst>
+      <p:ext uri="{BB962C8B-B14F-4D97-AF65-F5344CB8AC3E}">
+        <p14:creationId xmlns:p14="http://schemas.microsoft.com/office/powerpoint/2010/main" val="2956849678"/>
+      </p:ext>
+    </p:extLst>
+  </p:cSld>
+  <p:clrMapOvr>
+    <a:masterClrMapping/>
+  </p:clrMapOvr>
+  <p:timing>
+    <p:tnLst>
+      <p:par>
+        <p:cTn id="1" dur="indefinite" restart="never" nodeType="tmRoot"/>
+      </p:par>
+    </p:tnLst>
+  </p:timing>
+</p:sld>
+</file>
+
+<file path=ppt/slides/slide20.xml><?xml version="1.0" encoding="utf-8"?>
 <p:sld xmlns:a="http://schemas.openxmlformats.org/drawingml/2006/main" xmlns:r="http://schemas.openxmlformats.org/officeDocument/2006/relationships" xmlns:p="http://schemas.openxmlformats.org/presentationml/2006/main">
   <p:cSld>
     <p:spTree>
@@ -8829,10 +8569,17 @@
   <p:clrMapOvr>
     <a:masterClrMapping/>
   </p:clrMapOvr>
+  <p:timing>
+    <p:tnLst>
+      <p:par>
+        <p:cTn id="1" dur="indefinite" restart="never" nodeType="tmRoot"/>
+      </p:par>
+    </p:tnLst>
+  </p:timing>
 </p:sld>
 </file>
 
-<file path=ppt/slides/slide22.xml><?xml version="1.0" encoding="utf-8"?>
+<file path=ppt/slides/slide21.xml><?xml version="1.0" encoding="utf-8"?>
 <p:sld xmlns:a="http://schemas.openxmlformats.org/drawingml/2006/main" xmlns:r="http://schemas.openxmlformats.org/officeDocument/2006/relationships" xmlns:p="http://schemas.openxmlformats.org/presentationml/2006/main">
   <p:cSld>
     <p:spTree>
@@ -8918,7 +8665,7 @@
 </p:sld>
 </file>
 
-<file path=ppt/slides/slide23.xml><?xml version="1.0" encoding="utf-8"?>
+<file path=ppt/slides/slide22.xml><?xml version="1.0" encoding="utf-8"?>
 <p:sld xmlns:a="http://schemas.openxmlformats.org/drawingml/2006/main" xmlns:r="http://schemas.openxmlformats.org/officeDocument/2006/relationships" xmlns:p="http://schemas.openxmlformats.org/presentationml/2006/main">
   <p:cSld>
     <p:spTree>
@@ -9259,6 +9006,13 @@
   <p:clrMapOvr>
     <a:masterClrMapping/>
   </p:clrMapOvr>
+  <p:timing>
+    <p:tnLst>
+      <p:par>
+        <p:cTn id="1" dur="indefinite" restart="never" nodeType="tmRoot"/>
+      </p:par>
+    </p:tnLst>
+  </p:timing>
 </p:sld>
 </file>
 
@@ -9361,6 +9115,13 @@
   <p:clrMapOvr>
     <a:masterClrMapping/>
   </p:clrMapOvr>
+  <p:timing>
+    <p:tnLst>
+      <p:par>
+        <p:cTn id="1" dur="indefinite" restart="never" nodeType="tmRoot"/>
+      </p:par>
+    </p:tnLst>
+  </p:timing>
 </p:sld>
 </file>
 
@@ -9461,6 +9222,13 @@
   <p:clrMapOvr>
     <a:masterClrMapping/>
   </p:clrMapOvr>
+  <p:timing>
+    <p:tnLst>
+      <p:par>
+        <p:cTn id="1" dur="indefinite" restart="never" nodeType="tmRoot"/>
+      </p:par>
+    </p:tnLst>
+  </p:timing>
 </p:sld>
 </file>
 
@@ -9916,6 +9684,13 @@
   <p:clrMapOvr>
     <a:masterClrMapping/>
   </p:clrMapOvr>
+  <p:timing>
+    <p:tnLst>
+      <p:par>
+        <p:cTn id="1" dur="indefinite" restart="never" nodeType="tmRoot"/>
+      </p:par>
+    </p:tnLst>
+  </p:timing>
 </p:sld>
 </file>
 
@@ -10036,6 +9811,13 @@
   <p:clrMapOvr>
     <a:masterClrMapping/>
   </p:clrMapOvr>
+  <p:timing>
+    <p:tnLst>
+      <p:par>
+        <p:cTn id="1" dur="indefinite" restart="never" nodeType="tmRoot"/>
+      </p:par>
+    </p:tnLst>
+  </p:timing>
 </p:sld>
 </file>
 

</xml_diff>